<commit_message>
vault backup: 2024-01-12 20:52:01
</commit_message>
<xml_diff>
--- a/Atomic_Red_Team/Slides.pptx
+++ b/Atomic_Red_Team/Slides.pptx
@@ -132,6 +132,11 @@
       </a:defRPr>
     </a:lvl9pPr>
   </p:defaultTextStyle>
+  <p:extLst>
+    <p:ext uri="{EFAFB233-063F-42B5-8137-9DF3F51BA10A}">
+      <p15:sldGuideLst xmlns:p15="http://schemas.microsoft.com/office/powerpoint/2012/main"/>
+    </p:ext>
+  </p:extLst>
 </p:presentation>
 </file>
 
@@ -3991,12 +3996,12 @@
         </a:fontRef>
       </dsp:style>
       <dsp:txBody>
-        <a:bodyPr spcFirstLastPara="0" vert="horz" wrap="square" lIns="113792" tIns="113792" rIns="113792" bIns="113792" numCol="1" spcCol="1270" anchor="ctr" anchorCtr="0">
+        <a:bodyPr spcFirstLastPara="0" vert="horz" wrap="square" lIns="106680" tIns="106680" rIns="106680" bIns="106680" numCol="1" spcCol="1270" anchor="ctr" anchorCtr="0">
           <a:noAutofit/>
         </a:bodyPr>
         <a:lstStyle/>
         <a:p>
-          <a:pPr marL="0" lvl="0" indent="0" algn="ctr" defTabSz="711200">
+          <a:pPr marL="0" lvl="0" indent="0" algn="ctr" defTabSz="666750">
             <a:lnSpc>
               <a:spcPct val="90000"/>
             </a:lnSpc>
@@ -4009,10 +4014,10 @@
             <a:buNone/>
           </a:pPr>
           <a:r>
-            <a:rPr lang="en-IN" sz="1600" b="1" kern="1200"/>
+            <a:rPr lang="en-IN" sz="1500" b="1" kern="1200"/>
             <a:t>Released two of the greatest and most used things by Cybersecurity Professionals.</a:t>
           </a:r>
-          <a:endParaRPr lang="en-US" sz="1600" kern="1200"/>
+          <a:endParaRPr lang="en-US" sz="1500" kern="1200"/>
         </a:p>
       </dsp:txBody>
       <dsp:txXfrm>
@@ -4313,12 +4318,12 @@
         </a:fontRef>
       </dsp:style>
       <dsp:txBody>
-        <a:bodyPr spcFirstLastPara="0" vert="horz" wrap="square" lIns="113792" tIns="113792" rIns="113792" bIns="113792" numCol="1" spcCol="1270" anchor="ctr" anchorCtr="0">
+        <a:bodyPr spcFirstLastPara="0" vert="horz" wrap="square" lIns="106680" tIns="106680" rIns="106680" bIns="106680" numCol="1" spcCol="1270" anchor="ctr" anchorCtr="0">
           <a:noAutofit/>
         </a:bodyPr>
         <a:lstStyle/>
         <a:p>
-          <a:pPr marL="0" lvl="0" indent="0" algn="ctr" defTabSz="711200">
+          <a:pPr marL="0" lvl="0" indent="0" algn="ctr" defTabSz="666750">
             <a:lnSpc>
               <a:spcPct val="90000"/>
             </a:lnSpc>
@@ -4331,7 +4336,7 @@
             <a:buNone/>
           </a:pPr>
           <a:r>
-            <a:rPr lang="en-US" sz="1600" kern="1200"/>
+            <a:rPr lang="en-US" sz="1500" kern="1200"/>
             <a:t>The Mitre Corporation (stylized as The MITRE Corporation and MITRE) is an American not-for-profit organization.</a:t>
           </a:r>
         </a:p>
@@ -9301,7 +9306,7 @@
             <a:pPr algn="l"/>
             <a:fld id="{0DCFB061-4267-4D9F-8017-6F550D3068DF}" type="datetime1">
               <a:rPr lang="en-US" smtClean="0"/>
-              <a:t>1/2/2024</a:t>
+              <a:t>1/12/2024</a:t>
             </a:fld>
             <a:endParaRPr lang="en-US" dirty="0"/>
           </a:p>
@@ -9494,7 +9499,7 @@
           <a:p>
             <a:fld id="{8141BC61-5547-4A60-8DA1-6699760D9972}" type="datetime1">
               <a:rPr lang="en-US" smtClean="0"/>
-              <a:t>1/2/2024</a:t>
+              <a:t>1/12/2024</a:t>
             </a:fld>
             <a:endParaRPr lang="en-US" dirty="0"/>
           </a:p>
@@ -9679,7 +9684,7 @@
           <a:p>
             <a:fld id="{24B9D1C6-60D0-4CD1-8F31-F912522EB041}" type="datetime1">
               <a:rPr lang="en-US" smtClean="0"/>
-              <a:t>1/2/2024</a:t>
+              <a:t>1/12/2024</a:t>
             </a:fld>
             <a:endParaRPr lang="en-US" dirty="0"/>
           </a:p>
@@ -9924,7 +9929,7 @@
           <a:p>
             <a:fld id="{A39046A1-D8C9-4F40-AEEE-EA77EF3DF4A6}" type="datetimeFigureOut">
               <a:rPr lang="en-US" smtClean="0"/>
-              <a:t>1/2/2024</a:t>
+              <a:t>1/12/2024</a:t>
             </a:fld>
             <a:endParaRPr lang="en-US"/>
           </a:p>
@@ -10106,7 +10111,7 @@
           <a:p>
             <a:fld id="{47A4ED5C-5A53-433E-8A55-46F54CE81DA5}" type="datetime1">
               <a:rPr lang="en-US" smtClean="0"/>
-              <a:t>1/2/2024</a:t>
+              <a:t>1/12/2024</a:t>
             </a:fld>
             <a:endParaRPr lang="en-US" dirty="0"/>
           </a:p>
@@ -10433,7 +10438,7 @@
           <a:p>
             <a:fld id="{29CABC0C-B6DF-45E9-B954-11C99AA62C3E}" type="datetime1">
               <a:rPr lang="en-US" smtClean="0"/>
-              <a:t>1/2/2024</a:t>
+              <a:t>1/12/2024</a:t>
             </a:fld>
             <a:endParaRPr lang="en-US" dirty="0"/>
           </a:p>
@@ -10729,7 +10734,7 @@
           <a:p>
             <a:fld id="{A4AB71B9-2624-4F21-93EE-35A78B1A0DAD}" type="datetime1">
               <a:rPr lang="en-US" smtClean="0"/>
-              <a:t>1/2/2024</a:t>
+              <a:t>1/12/2024</a:t>
             </a:fld>
             <a:endParaRPr lang="en-US" dirty="0"/>
           </a:p>
@@ -11150,7 +11155,7 @@
           <a:p>
             <a:fld id="{36D37C2A-BE2E-4840-A907-3254E2916C96}" type="datetime1">
               <a:rPr lang="en-US" smtClean="0"/>
-              <a:t>1/2/2024</a:t>
+              <a:t>1/12/2024</a:t>
             </a:fld>
             <a:endParaRPr lang="en-US" dirty="0"/>
           </a:p>
@@ -11348,7 +11353,7 @@
           <a:p>
             <a:fld id="{005CD215-1C45-48A0-8534-39FFE8A7C95A}" type="datetime1">
               <a:rPr lang="en-US" smtClean="0"/>
-              <a:t>1/2/2024</a:t>
+              <a:t>1/12/2024</a:t>
             </a:fld>
             <a:endParaRPr lang="en-US" dirty="0"/>
           </a:p>
@@ -11457,7 +11462,7 @@
           <a:p>
             <a:fld id="{D3363A0F-DEF3-4134-98D0-2E1276938A8B}" type="datetime1">
               <a:rPr lang="en-US" smtClean="0"/>
-              <a:t>1/2/2024</a:t>
+              <a:t>1/12/2024</a:t>
             </a:fld>
             <a:endParaRPr lang="en-US" dirty="0"/>
           </a:p>
@@ -11878,7 +11883,7 @@
           <a:p>
             <a:fld id="{61A2E4C8-2960-4ADD-862C-4D9643CB15AC}" type="datetime1">
               <a:rPr lang="en-US" smtClean="0"/>
-              <a:t>1/2/2024</a:t>
+              <a:t>1/12/2024</a:t>
             </a:fld>
             <a:endParaRPr lang="en-US" dirty="0"/>
           </a:p>
@@ -12231,7 +12236,7 @@
           <a:p>
             <a:fld id="{48BDEA15-09CD-4275-A8E0-385C965F48B0}" type="datetime1">
               <a:rPr lang="en-US" smtClean="0"/>
-              <a:t>1/2/2024</a:t>
+              <a:t>1/12/2024</a:t>
             </a:fld>
             <a:endParaRPr lang="en-US" dirty="0"/>
           </a:p>
@@ -12536,7 +12541,7 @@
           <a:p>
             <a:fld id="{4AF8082C-0922-4249-A612-B415F5231620}" type="datetime1">
               <a:rPr lang="en-US" smtClean="0"/>
-              <a:t>1/2/2024</a:t>
+              <a:t>1/12/2024</a:t>
             </a:fld>
             <a:endParaRPr lang="en-US" dirty="0"/>
           </a:p>
@@ -13176,7 +13181,7 @@
           <a:p>
             <a:fld id="{A39046A1-D8C9-4F40-AEEE-EA77EF3DF4A6}" type="datetimeFigureOut">
               <a:rPr lang="en-US" smtClean="0"/>
-              <a:t>1/2/2024</a:t>
+              <a:t>1/12/2024</a:t>
             </a:fld>
             <a:endParaRPr lang="en-US"/>
           </a:p>
@@ -21660,41 +21665,6 @@
           </a:custGeom>
         </p:spPr>
       </p:pic>
-      <p:sp>
-        <p:nvSpPr>
-          <p:cNvPr id="4" name="TextBox 3">
-            <a:extLst>
-              <a:ext uri="{FF2B5EF4-FFF2-40B4-BE49-F238E27FC236}">
-                <a16:creationId xmlns:a16="http://schemas.microsoft.com/office/drawing/2014/main" id="{0E743C3D-83F4-EE25-096C-FA335F7139CE}"/>
-              </a:ext>
-            </a:extLst>
-          </p:cNvPr>
-          <p:cNvSpPr txBox="1"/>
-          <p:nvPr/>
-        </p:nvSpPr>
-        <p:spPr>
-          <a:xfrm>
-            <a:off x="6442204" y="4241155"/>
-            <a:ext cx="5251448" cy="369332"/>
-          </a:xfrm>
-          <a:prstGeom prst="rect">
-            <a:avLst/>
-          </a:prstGeom>
-          <a:noFill/>
-        </p:spPr>
-        <p:txBody>
-          <a:bodyPr wrap="square" rtlCol="0">
-            <a:spAutoFit/>
-          </a:bodyPr>
-          <a:lstStyle/>
-          <a:p>
-            <a:r>
-              <a:rPr lang="en-IN" dirty="0"/>
-              <a:t>Will be delivered in person</a:t>
-            </a:r>
-          </a:p>
-        </p:txBody>
-      </p:sp>
     </p:spTree>
     <p:extLst>
       <p:ext uri="{BB962C8B-B14F-4D97-AF65-F5344CB8AC3E}">

</xml_diff>

<commit_message>
vault backup: 2024-01-12 20:57:19
</commit_message>
<xml_diff>
--- a/Atomic_Red_Team/Slides.pptx
+++ b/Atomic_Red_Team/Slides.pptx
@@ -13598,10 +13598,10 @@
       </p:grpSpPr>
       <p:sp useBgFill="1">
         <p:nvSpPr>
-          <p:cNvPr id="9" name="Rectangle 8">
+          <p:cNvPr id="47" name="Rectangle 46">
             <a:extLst>
               <a:ext uri="{FF2B5EF4-FFF2-40B4-BE49-F238E27FC236}">
-                <a16:creationId xmlns:a16="http://schemas.microsoft.com/office/drawing/2014/main" id="{B725BC23-E0DD-4037-B2B8-7B6FA64543FB}"/>
+                <a16:creationId xmlns:a16="http://schemas.microsoft.com/office/drawing/2014/main" id="{EA164D6B-6878-4B9F-A2D0-985D39B17B46}"/>
               </a:ext>
               <a:ext uri="{C183D7F6-B498-43B3-948B-1728B52AA6E4}">
                 <adec:decorative xmlns:adec="http://schemas.microsoft.com/office/drawing/2017/decorative" val="1"/>
@@ -13620,8 +13620,8 @@
           </p:nvPr>
         </p:nvSpPr>
         <p:spPr>
-          <a:xfrm flipH="1">
-            <a:off x="0" y="0"/>
+          <a:xfrm>
+            <a:off x="-1" y="0"/>
             <a:ext cx="12192001" cy="6858000"/>
           </a:xfrm>
           <a:prstGeom prst="rect">
@@ -13658,10 +13658,10 @@
       </p:sp>
       <p:sp>
         <p:nvSpPr>
-          <p:cNvPr id="11" name="Rectangle 10">
+          <p:cNvPr id="48" name="Rectangle 47">
             <a:extLst>
               <a:ext uri="{FF2B5EF4-FFF2-40B4-BE49-F238E27FC236}">
-                <a16:creationId xmlns:a16="http://schemas.microsoft.com/office/drawing/2014/main" id="{199EE120-2D35-4A48-BAAE-238F986A13DC}"/>
+                <a16:creationId xmlns:a16="http://schemas.microsoft.com/office/drawing/2014/main" id="{064738AB-B6BE-4867-889A-52CE4AC8DBD0}"/>
               </a:ext>
               <a:ext uri="{C183D7F6-B498-43B3-948B-1728B52AA6E4}">
                 <adec:decorative xmlns:adec="http://schemas.microsoft.com/office/drawing/2017/decorative" val="1"/>
@@ -13680,15 +13680,15 @@
           </p:nvPr>
         </p:nvSpPr>
         <p:spPr>
-          <a:xfrm flipH="1">
-            <a:off x="0" y="0"/>
-            <a:ext cx="4426072" cy="1804072"/>
+          <a:xfrm>
+            <a:off x="-1" y="1095508"/>
+            <a:ext cx="4668819" cy="5016893"/>
           </a:xfrm>
           <a:prstGeom prst="rect">
             <a:avLst/>
           </a:prstGeom>
           <a:solidFill>
-            <a:schemeClr val="accent1"/>
+            <a:schemeClr val="tx2"/>
           </a:solidFill>
           <a:ln>
             <a:noFill/>
@@ -13719,47 +13719,95 @@
           </a:p>
         </p:txBody>
       </p:sp>
-      <p:pic>
-        <p:nvPicPr>
-          <p:cNvPr id="4" name="Picture 3">
+      <p:sp>
+        <p:nvSpPr>
+          <p:cNvPr id="2" name="Title 1">
             <a:extLst>
               <a:ext uri="{FF2B5EF4-FFF2-40B4-BE49-F238E27FC236}">
-                <a16:creationId xmlns:a16="http://schemas.microsoft.com/office/drawing/2014/main" id="{8F9ED8A9-AF52-D575-E267-20C740C18BA5}"/>
+                <a16:creationId xmlns:a16="http://schemas.microsoft.com/office/drawing/2014/main" id="{988CECBC-D029-9F42-7052-1A331FF5746D}"/>
               </a:ext>
             </a:extLst>
           </p:cNvPr>
-          <p:cNvPicPr>
-            <a:picLocks noChangeAspect="1"/>
-          </p:cNvPicPr>
-          <p:nvPr/>
-        </p:nvPicPr>
-        <p:blipFill>
-          <a:blip r:embed="rId2">
-            <a:extLst>
-              <a:ext uri="{28A0092B-C50C-407E-A947-70E740481C1C}">
-                <a14:useLocalDpi xmlns:a14="http://schemas.microsoft.com/office/drawing/2010/main" val="0"/>
-              </a:ext>
-            </a:extLst>
-          </a:blip>
-          <a:srcRect t="1214" b="1214"/>
-          <a:stretch/>
-        </p:blipFill>
+          <p:cNvSpPr>
+            <a:spLocks noGrp="1"/>
+          </p:cNvSpPr>
+          <p:nvPr>
+            <p:ph type="ctrTitle"/>
+          </p:nvPr>
+        </p:nvSpPr>
         <p:spPr>
           <a:xfrm>
-            <a:off x="20" y="1804072"/>
-            <a:ext cx="4458058" cy="4349801"/>
+            <a:off x="463825" y="1709530"/>
+            <a:ext cx="3754671" cy="2528515"/>
           </a:xfrm>
-          <a:prstGeom prst="rect">
-            <a:avLst/>
-          </a:prstGeom>
         </p:spPr>
-      </p:pic>
+        <p:txBody>
+          <a:bodyPr anchor="b">
+            <a:normAutofit/>
+          </a:bodyPr>
+          <a:lstStyle/>
+          <a:p>
+            <a:pPr>
+              <a:lnSpc>
+                <a:spcPct val="115000"/>
+              </a:lnSpc>
+            </a:pPr>
+            <a:r>
+              <a:rPr lang="en-IN" sz="2500" b="1">
+                <a:solidFill>
+                  <a:schemeClr val="bg1"/>
+                </a:solidFill>
+              </a:rPr>
+              <a:t>Adversarial Emulation Using Atomic Red Team and MITRE ATT&amp;CK</a:t>
+            </a:r>
+          </a:p>
+        </p:txBody>
+      </p:sp>
       <p:sp>
         <p:nvSpPr>
-          <p:cNvPr id="13" name="Rectangle 12">
+          <p:cNvPr id="3" name="Subtitle 2">
             <a:extLst>
               <a:ext uri="{FF2B5EF4-FFF2-40B4-BE49-F238E27FC236}">
-                <a16:creationId xmlns:a16="http://schemas.microsoft.com/office/drawing/2014/main" id="{552F9EAC-0C70-441C-AC78-65174C285730}"/>
+                <a16:creationId xmlns:a16="http://schemas.microsoft.com/office/drawing/2014/main" id="{4A2F77AE-DCB4-631D-54CC-8AA1C9CA4021}"/>
+              </a:ext>
+            </a:extLst>
+          </p:cNvPr>
+          <p:cNvSpPr>
+            <a:spLocks noGrp="1"/>
+          </p:cNvSpPr>
+          <p:nvPr>
+            <p:ph type="subTitle" idx="1"/>
+          </p:nvPr>
+        </p:nvSpPr>
+        <p:spPr>
+          <a:xfrm>
+            <a:off x="408166" y="4238046"/>
+            <a:ext cx="3806919" cy="1741404"/>
+          </a:xfrm>
+        </p:spPr>
+        <p:txBody>
+          <a:bodyPr anchor="t">
+            <a:normAutofit/>
+          </a:bodyPr>
+          <a:lstStyle/>
+          <a:p>
+            <a:r>
+              <a:rPr lang="en-IN" sz="2000">
+                <a:solidFill>
+                  <a:schemeClr val="bg1"/>
+                </a:solidFill>
+              </a:rPr>
+              <a:t>- Tarun Sai Katta Sreenivasulu</a:t>
+            </a:r>
+          </a:p>
+        </p:txBody>
+      </p:sp>
+      <p:sp>
+        <p:nvSpPr>
+          <p:cNvPr id="49" name="Rectangle 48">
+            <a:extLst>
+              <a:ext uri="{FF2B5EF4-FFF2-40B4-BE49-F238E27FC236}">
+                <a16:creationId xmlns:a16="http://schemas.microsoft.com/office/drawing/2014/main" id="{BBD49B71-B686-4DFD-93AD-40CB19B626B9}"/>
               </a:ext>
               <a:ext uri="{C183D7F6-B498-43B3-948B-1728B52AA6E4}">
                 <adec:decorative xmlns:adec="http://schemas.microsoft.com/office/drawing/2017/decorative" val="1"/>
@@ -13778,9 +13826,9 @@
           </p:nvPr>
         </p:nvSpPr>
         <p:spPr>
-          <a:xfrm flipH="1">
-            <a:off x="4426076" y="1740090"/>
-            <a:ext cx="7765922" cy="4427525"/>
+          <a:xfrm>
+            <a:off x="4672066" y="0"/>
+            <a:ext cx="7519934" cy="6858000"/>
           </a:xfrm>
           <a:prstGeom prst="rect">
             <a:avLst/>
@@ -13819,87 +13867,47 @@
           </a:p>
         </p:txBody>
       </p:sp>
+      <p:pic>
+        <p:nvPicPr>
+          <p:cNvPr id="4" name="Picture 3">
+            <a:extLst>
+              <a:ext uri="{FF2B5EF4-FFF2-40B4-BE49-F238E27FC236}">
+                <a16:creationId xmlns:a16="http://schemas.microsoft.com/office/drawing/2014/main" id="{8F9ED8A9-AF52-D575-E267-20C740C18BA5}"/>
+              </a:ext>
+            </a:extLst>
+          </p:cNvPr>
+          <p:cNvPicPr>
+            <a:picLocks noChangeAspect="1"/>
+          </p:cNvPicPr>
+          <p:nvPr/>
+        </p:nvPicPr>
+        <p:blipFill>
+          <a:blip r:embed="rId2">
+            <a:extLst>
+              <a:ext uri="{28A0092B-C50C-407E-A947-70E740481C1C}">
+                <a14:useLocalDpi xmlns:a14="http://schemas.microsoft.com/office/drawing/2010/main" val="0"/>
+              </a:ext>
+            </a:extLst>
+          </a:blip>
+          <a:srcRect t="1214" b="1214"/>
+          <a:stretch/>
+        </p:blipFill>
+        <p:spPr>
+          <a:xfrm>
+            <a:off x="5859540" y="1095508"/>
+            <a:ext cx="5141738" cy="5016894"/>
+          </a:xfrm>
+          <a:prstGeom prst="rect">
+            <a:avLst/>
+          </a:prstGeom>
+        </p:spPr>
+      </p:pic>
       <p:sp>
         <p:nvSpPr>
-          <p:cNvPr id="2" name="Title 1">
+          <p:cNvPr id="50" name="Rectangle 49">
             <a:extLst>
               <a:ext uri="{FF2B5EF4-FFF2-40B4-BE49-F238E27FC236}">
-                <a16:creationId xmlns:a16="http://schemas.microsoft.com/office/drawing/2014/main" id="{988CECBC-D029-9F42-7052-1A331FF5746D}"/>
-              </a:ext>
-            </a:extLst>
-          </p:cNvPr>
-          <p:cNvSpPr>
-            <a:spLocks noGrp="1"/>
-          </p:cNvSpPr>
-          <p:nvPr>
-            <p:ph type="ctrTitle"/>
-          </p:nvPr>
-        </p:nvSpPr>
-        <p:spPr>
-          <a:xfrm>
-            <a:off x="4882101" y="2146851"/>
-            <a:ext cx="6666980" cy="2658269"/>
-          </a:xfrm>
-        </p:spPr>
-        <p:txBody>
-          <a:bodyPr anchor="b">
-            <a:normAutofit/>
-          </a:bodyPr>
-          <a:lstStyle/>
-          <a:p>
-            <a:pPr>
-              <a:lnSpc>
-                <a:spcPct val="115000"/>
-              </a:lnSpc>
-            </a:pPr>
-            <a:r>
-              <a:rPr lang="en-IN" sz="3300" b="1" dirty="0"/>
-              <a:t>Adversarial Emulation Using Atomic Red Team and MITRE ATT&amp;CK</a:t>
-            </a:r>
-          </a:p>
-        </p:txBody>
-      </p:sp>
-      <p:sp>
-        <p:nvSpPr>
-          <p:cNvPr id="3" name="Subtitle 2">
-            <a:extLst>
-              <a:ext uri="{FF2B5EF4-FFF2-40B4-BE49-F238E27FC236}">
-                <a16:creationId xmlns:a16="http://schemas.microsoft.com/office/drawing/2014/main" id="{4A2F77AE-DCB4-631D-54CC-8AA1C9CA4021}"/>
-              </a:ext>
-            </a:extLst>
-          </p:cNvPr>
-          <p:cNvSpPr>
-            <a:spLocks noGrp="1"/>
-          </p:cNvSpPr>
-          <p:nvPr>
-            <p:ph type="subTitle" idx="1"/>
-          </p:nvPr>
-        </p:nvSpPr>
-        <p:spPr>
-          <a:xfrm>
-            <a:off x="4882102" y="4810937"/>
-            <a:ext cx="6666980" cy="1172200"/>
-          </a:xfrm>
-        </p:spPr>
-        <p:txBody>
-          <a:bodyPr anchor="t">
-            <a:normAutofit/>
-          </a:bodyPr>
-          <a:lstStyle/>
-          <a:p>
-            <a:r>
-              <a:rPr lang="en-IN" dirty="0"/>
-              <a:t>- Tarun Sai Katta Sreenivasulu</a:t>
-            </a:r>
-          </a:p>
-        </p:txBody>
-      </p:sp>
-      <p:sp>
-        <p:nvSpPr>
-          <p:cNvPr id="15" name="Rectangle 14">
-            <a:extLst>
-              <a:ext uri="{FF2B5EF4-FFF2-40B4-BE49-F238E27FC236}">
-                <a16:creationId xmlns:a16="http://schemas.microsoft.com/office/drawing/2014/main" id="{0D48F6B8-EF56-4340-982E-F4D6F5DC2F57}"/>
+                <a16:creationId xmlns:a16="http://schemas.microsoft.com/office/drawing/2014/main" id="{7C60369F-A41B-4D6E-8990-30E2715C5730}"/>
               </a:ext>
               <a:ext uri="{C183D7F6-B498-43B3-948B-1728B52AA6E4}">
                 <adec:decorative xmlns:adec="http://schemas.microsoft.com/office/drawing/2017/decorative" val="1"/>
@@ -13919,198 +13927,7 @@
         </p:nvSpPr>
         <p:spPr>
           <a:xfrm>
-            <a:off x="1525" y="1753806"/>
-            <a:ext cx="12188951" cy="64008"/>
-          </a:xfrm>
-          <a:prstGeom prst="rect">
-            <a:avLst/>
-          </a:prstGeom>
-          <a:solidFill>
-            <a:schemeClr val="tx2"/>
-          </a:solidFill>
-          <a:ln>
-            <a:noFill/>
-          </a:ln>
-        </p:spPr>
-        <p:style>
-          <a:lnRef idx="2">
-            <a:schemeClr val="accent1">
-              <a:shade val="50000"/>
-            </a:schemeClr>
-          </a:lnRef>
-          <a:fillRef idx="1">
-            <a:schemeClr val="accent1"/>
-          </a:fillRef>
-          <a:effectRef idx="0">
-            <a:schemeClr val="accent1"/>
-          </a:effectRef>
-          <a:fontRef idx="minor">
-            <a:schemeClr val="lt1"/>
-          </a:fontRef>
-        </p:style>
-        <p:txBody>
-          <a:bodyPr rtlCol="0" anchor="ctr"/>
-          <a:lstStyle/>
-          <a:p>
-            <a:pPr algn="ctr"/>
-            <a:endParaRPr lang="en-US"/>
-          </a:p>
-        </p:txBody>
-      </p:sp>
-      <p:sp>
-        <p:nvSpPr>
-          <p:cNvPr id="17" name="Rectangle 16">
-            <a:extLst>
-              <a:ext uri="{FF2B5EF4-FFF2-40B4-BE49-F238E27FC236}">
-                <a16:creationId xmlns:a16="http://schemas.microsoft.com/office/drawing/2014/main" id="{AC596C40-FEA6-4867-853D-CF37DE3B6BF3}"/>
-              </a:ext>
-              <a:ext uri="{C183D7F6-B498-43B3-948B-1728B52AA6E4}">
-                <adec:decorative xmlns:adec="http://schemas.microsoft.com/office/drawing/2017/decorative" val="1"/>
-              </a:ext>
-            </a:extLst>
-          </p:cNvPr>
-          <p:cNvSpPr>
-            <a:spLocks noGrp="1" noRot="1" noChangeAspect="1" noMove="1" noResize="1" noEditPoints="1" noAdjustHandles="1" noChangeArrowheads="1" noChangeShapeType="1" noTextEdit="1"/>
-          </p:cNvSpPr>
-          <p:nvPr>
-            <p:extLst>
-              <p:ext uri="{386F3935-93C4-4BCD-93E2-E3B085C9AB24}">
-                <p16:designElem xmlns:p16="http://schemas.microsoft.com/office/powerpoint/2015/main" val="1"/>
-              </p:ext>
-            </p:extLst>
-          </p:nvPr>
-        </p:nvSpPr>
-        <p:spPr>
-          <a:xfrm flipH="1">
-            <a:off x="-3049" y="6167615"/>
-            <a:ext cx="12192001" cy="690385"/>
-          </a:xfrm>
-          <a:prstGeom prst="rect">
-            <a:avLst/>
-          </a:prstGeom>
-          <a:solidFill>
-            <a:schemeClr val="bg1">
-              <a:alpha val="75000"/>
-            </a:schemeClr>
-          </a:solidFill>
-          <a:ln>
-            <a:noFill/>
-          </a:ln>
-        </p:spPr>
-        <p:style>
-          <a:lnRef idx="2">
-            <a:schemeClr val="accent1">
-              <a:shade val="50000"/>
-            </a:schemeClr>
-          </a:lnRef>
-          <a:fillRef idx="1">
-            <a:schemeClr val="accent1"/>
-          </a:fillRef>
-          <a:effectRef idx="0">
-            <a:schemeClr val="accent1"/>
-          </a:effectRef>
-          <a:fontRef idx="minor">
-            <a:schemeClr val="lt1"/>
-          </a:fontRef>
-        </p:style>
-        <p:txBody>
-          <a:bodyPr rtlCol="0" anchor="ctr"/>
-          <a:lstStyle/>
-          <a:p>
-            <a:pPr algn="ctr"/>
-            <a:endParaRPr lang="en-US"/>
-          </a:p>
-        </p:txBody>
-      </p:sp>
-      <p:sp>
-        <p:nvSpPr>
-          <p:cNvPr id="19" name="Rectangle 18">
-            <a:extLst>
-              <a:ext uri="{FF2B5EF4-FFF2-40B4-BE49-F238E27FC236}">
-                <a16:creationId xmlns:a16="http://schemas.microsoft.com/office/drawing/2014/main" id="{9DC7C5E2-274E-49A3-A8E0-46A5B8CAC3D4}"/>
-              </a:ext>
-              <a:ext uri="{C183D7F6-B498-43B3-948B-1728B52AA6E4}">
-                <adec:decorative xmlns:adec="http://schemas.microsoft.com/office/drawing/2017/decorative" val="1"/>
-              </a:ext>
-            </a:extLst>
-          </p:cNvPr>
-          <p:cNvSpPr>
-            <a:spLocks noGrp="1" noRot="1" noChangeAspect="1" noMove="1" noResize="1" noEditPoints="1" noAdjustHandles="1" noChangeArrowheads="1" noChangeShapeType="1" noTextEdit="1"/>
-          </p:cNvSpPr>
-          <p:nvPr>
-            <p:extLst>
-              <p:ext uri="{386F3935-93C4-4BCD-93E2-E3B085C9AB24}">
-                <p16:designElem xmlns:p16="http://schemas.microsoft.com/office/powerpoint/2015/main" val="1"/>
-              </p:ext>
-            </p:extLst>
-          </p:nvPr>
-        </p:nvSpPr>
-        <p:spPr>
-          <a:xfrm>
-            <a:off x="1525" y="6109423"/>
-            <a:ext cx="12188951" cy="64008"/>
-          </a:xfrm>
-          <a:prstGeom prst="rect">
-            <a:avLst/>
-          </a:prstGeom>
-          <a:solidFill>
-            <a:schemeClr val="tx2"/>
-          </a:solidFill>
-          <a:ln>
-            <a:noFill/>
-          </a:ln>
-        </p:spPr>
-        <p:style>
-          <a:lnRef idx="2">
-            <a:schemeClr val="accent1">
-              <a:shade val="50000"/>
-            </a:schemeClr>
-          </a:lnRef>
-          <a:fillRef idx="1">
-            <a:schemeClr val="accent1"/>
-          </a:fillRef>
-          <a:effectRef idx="0">
-            <a:schemeClr val="accent1"/>
-          </a:effectRef>
-          <a:fontRef idx="minor">
-            <a:schemeClr val="lt1"/>
-          </a:fontRef>
-        </p:style>
-        <p:txBody>
-          <a:bodyPr rtlCol="0" anchor="ctr"/>
-          <a:lstStyle/>
-          <a:p>
-            <a:pPr algn="ctr"/>
-            <a:endParaRPr lang="en-US"/>
-          </a:p>
-        </p:txBody>
-      </p:sp>
-      <p:sp>
-        <p:nvSpPr>
-          <p:cNvPr id="21" name="Rectangle 20">
-            <a:extLst>
-              <a:ext uri="{FF2B5EF4-FFF2-40B4-BE49-F238E27FC236}">
-                <a16:creationId xmlns:a16="http://schemas.microsoft.com/office/drawing/2014/main" id="{D6CF8D2C-9E01-48EC-8DDF-8A1FF60AED22}"/>
-              </a:ext>
-              <a:ext uri="{C183D7F6-B498-43B3-948B-1728B52AA6E4}">
-                <adec:decorative xmlns:adec="http://schemas.microsoft.com/office/drawing/2017/decorative" val="1"/>
-              </a:ext>
-            </a:extLst>
-          </p:cNvPr>
-          <p:cNvSpPr>
-            <a:spLocks noGrp="1" noRot="1" noChangeAspect="1" noMove="1" noResize="1" noEditPoints="1" noAdjustHandles="1" noChangeArrowheads="1" noChangeShapeType="1" noTextEdit="1"/>
-          </p:cNvSpPr>
-          <p:nvPr>
-            <p:extLst>
-              <p:ext uri="{386F3935-93C4-4BCD-93E2-E3B085C9AB24}">
-                <p16:designElem xmlns:p16="http://schemas.microsoft.com/office/powerpoint/2015/main" val="1"/>
-              </p:ext>
-            </p:extLst>
-          </p:nvPr>
-        </p:nvSpPr>
-        <p:spPr>
-          <a:xfrm>
-            <a:off x="4394070" y="0"/>
+            <a:off x="4606534" y="0"/>
             <a:ext cx="64008" cy="6858000"/>
           </a:xfrm>
           <a:prstGeom prst="rect">

</xml_diff>